<commit_message>
update to include between clause
</commit_message>
<xml_diff>
--- a/SQL/Day 2 Filtering and Ordering/Filtering and Ordering.pptx
+++ b/SQL/Day 2 Filtering and Ordering/Filtering and Ordering.pptx
@@ -381,7 +381,7 @@
               <a:pPr>
                 <a:defRPr/>
               </a:pPr>
-              <a:t>1/27/24</a:t>
+              <a:t>3/5/24</a:t>
             </a:fld>
             <a:endParaRPr lang="en-US" dirty="0"/>
           </a:p>
@@ -591,7 +591,7 @@
               <a:pPr>
                 <a:defRPr/>
               </a:pPr>
-              <a:t>1/27/24</a:t>
+              <a:t>3/5/24</a:t>
             </a:fld>
             <a:endParaRPr lang="en-US" dirty="0"/>
           </a:p>
@@ -21523,6 +21523,18 @@
                 <a:latin typeface="-apple-system"/>
               </a:rPr>
               <a:t>&gt;= Greater than or equal</a:t>
+            </a:r>
+          </a:p>
+          <a:p>
+            <a:pPr lvl="2"/>
+            <a:r>
+              <a:rPr lang="en-US" dirty="0">
+                <a:solidFill>
+                  <a:schemeClr val="tx1"/>
+                </a:solidFill>
+                <a:latin typeface="-apple-system"/>
+              </a:rPr>
+              <a:t>BETWEEN operator</a:t>
             </a:r>
             <a:endParaRPr lang="en-US" b="0" i="0" dirty="0">
               <a:solidFill>
@@ -24066,15 +24078,6 @@
 </file>
 
 <file path=customXml/item2.xml><?xml version="1.0" encoding="utf-8"?>
-<?mso-contentType ?>
-<FormTemplates xmlns="http://schemas.microsoft.com/sharepoint/v3/contenttype/forms">
-  <Display>DocumentLibraryForm</Display>
-  <Edit>DocumentLibraryForm</Edit>
-  <New>DocumentLibraryForm</New>
-</FormTemplates>
-</file>
-
-<file path=customXml/item3.xml><?xml version="1.0" encoding="utf-8"?>
 <ct:contentTypeSchema xmlns:ct="http://schemas.microsoft.com/office/2006/metadata/contentType" xmlns:ma="http://schemas.microsoft.com/office/2006/metadata/properties/metaAttributes" ct:_="" ma:_="" ma:contentTypeName="Document" ma:contentTypeID="0x010100D717D047DAB2764FBE8B85865ADF125C" ma:contentTypeVersion="0" ma:contentTypeDescription="Create a new document." ma:contentTypeScope="" ma:versionID="3154522c01a2510568c44eaa3f86772f">
   <xsd:schema xmlns:xsd="http://www.w3.org/2001/XMLSchema" xmlns:xs="http://www.w3.org/2001/XMLSchema" xmlns:p="http://schemas.microsoft.com/office/2006/metadata/properties" targetNamespace="http://schemas.microsoft.com/office/2006/metadata/properties" ma:root="true" ma:fieldsID="1b05d82d297216baf5b26c55225140df">
     <xsd:element name="properties">
@@ -24188,6 +24191,15 @@
 </ct:contentTypeSchema>
 </file>
 
+<file path=customXml/item3.xml><?xml version="1.0" encoding="utf-8"?>
+<?mso-contentType ?>
+<FormTemplates xmlns="http://schemas.microsoft.com/sharepoint/v3/contenttype/forms">
+  <Display>DocumentLibraryForm</Display>
+  <Edit>DocumentLibraryForm</Edit>
+  <New>DocumentLibraryForm</New>
+</FormTemplates>
+</file>
+
 <file path=customXml/itemProps1.xml><?xml version="1.0" encoding="utf-8"?>
 <ds:datastoreItem xmlns:ds="http://schemas.openxmlformats.org/officeDocument/2006/customXml" ds:itemID="{C530F82F-BEB8-4CE5-BAAE-EC5C7B644B7C}">
   <ds:schemaRefs>
@@ -24204,14 +24216,6 @@
 </file>
 
 <file path=customXml/itemProps2.xml><?xml version="1.0" encoding="utf-8"?>
-<ds:datastoreItem xmlns:ds="http://schemas.openxmlformats.org/officeDocument/2006/customXml" ds:itemID="{E49E43F2-009D-4FD5-9629-B1B9A3DF71DA}">
-  <ds:schemaRefs>
-    <ds:schemaRef ds:uri="http://schemas.microsoft.com/sharepoint/v3/contenttype/forms"/>
-  </ds:schemaRefs>
-</ds:datastoreItem>
-</file>
-
-<file path=customXml/itemProps3.xml><?xml version="1.0" encoding="utf-8"?>
 <ds:datastoreItem xmlns:ds="http://schemas.openxmlformats.org/officeDocument/2006/customXml" ds:itemID="{959784AE-7718-4684-9BBC-9AAC52D5A526}">
   <ds:schemaRefs>
     <ds:schemaRef ds:uri="http://schemas.microsoft.com/office/2006/metadata/contentType"/>
@@ -24225,4 +24229,12 @@
     <ds:schemaRef ds:uri="http://schemas.microsoft.com/office/infopath/2007/PartnerControls"/>
   </ds:schemaRefs>
 </ds:datastoreItem>
+</file>
+
+<file path=customXml/itemProps3.xml><?xml version="1.0" encoding="utf-8"?>
+<ds:datastoreItem xmlns:ds="http://schemas.openxmlformats.org/officeDocument/2006/customXml" ds:itemID="{E49E43F2-009D-4FD5-9629-B1B9A3DF71DA}">
+  <ds:schemaRefs>
+    <ds:schemaRef ds:uri="http://schemas.microsoft.com/sharepoint/v3/contenttype/forms"/>
+  </ds:schemaRefs>
+</ds:datastoreItem>
 </file>
</xml_diff>